<commit_message>
Update Initiation Machine Learning &ACP.pptx
</commit_message>
<xml_diff>
--- a/ml/Initiation Machine Learning &ACP.pptx
+++ b/ml/Initiation Machine Learning &ACP.pptx
@@ -7,8 +7,9 @@
   <p:sldIdLst>
     <p:sldId id="256" r:id="rId2"/>
     <p:sldId id="258" r:id="rId3"/>
-    <p:sldId id="257" r:id="rId4"/>
-    <p:sldId id="259" r:id="rId5"/>
+    <p:sldId id="260" r:id="rId4"/>
+    <p:sldId id="257" r:id="rId5"/>
+    <p:sldId id="259" r:id="rId6"/>
   </p:sldIdLst>
   <p:sldSz cx="12192000" cy="6858000"/>
   <p:notesSz cx="6858000" cy="9144000"/>
@@ -107,6 +108,11 @@
       </a:defRPr>
     </a:lvl9pPr>
   </p:defaultTextStyle>
+  <p:extLst>
+    <p:ext uri="{EFAFB233-063F-42B5-8137-9DF3F51BA10A}">
+      <p15:sldGuideLst xmlns:p15="http://schemas.microsoft.com/office/powerpoint/2012/main"/>
+    </p:ext>
+  </p:extLst>
 </p:presentation>
 </file>
 
@@ -442,7 +448,7 @@
             <a:fld id="{B61BEF0D-F0BB-DE4B-95CE-6DB70DBA9567}" type="datetimeFigureOut">
               <a:rPr lang="en-US" dirty="0"/>
               <a:pPr/>
-              <a:t>5/10/2021</a:t>
+              <a:t>5/11/2021</a:t>
             </a:fld>
             <a:endParaRPr lang="en-US" dirty="0"/>
           </a:p>
@@ -763,7 +769,7 @@
             <a:fld id="{B61BEF0D-F0BB-DE4B-95CE-6DB70DBA9567}" type="datetimeFigureOut">
               <a:rPr lang="en-US" dirty="0"/>
               <a:pPr/>
-              <a:t>5/10/2021</a:t>
+              <a:t>5/11/2021</a:t>
             </a:fld>
             <a:endParaRPr lang="en-US" dirty="0"/>
           </a:p>
@@ -1008,7 +1014,7 @@
             <a:fld id="{B61BEF0D-F0BB-DE4B-95CE-6DB70DBA9567}" type="datetimeFigureOut">
               <a:rPr lang="en-US" dirty="0"/>
               <a:pPr/>
-              <a:t>5/10/2021</a:t>
+              <a:t>5/11/2021</a:t>
             </a:fld>
             <a:endParaRPr lang="en-US" dirty="0"/>
           </a:p>
@@ -1344,7 +1350,7 @@
             <a:fld id="{B61BEF0D-F0BB-DE4B-95CE-6DB70DBA9567}" type="datetimeFigureOut">
               <a:rPr lang="en-US" dirty="0"/>
               <a:pPr/>
-              <a:t>5/10/2021</a:t>
+              <a:t>5/11/2021</a:t>
             </a:fld>
             <a:endParaRPr lang="en-US" dirty="0"/>
           </a:p>
@@ -1688,7 +1694,7 @@
             <a:fld id="{B61BEF0D-F0BB-DE4B-95CE-6DB70DBA9567}" type="datetimeFigureOut">
               <a:rPr lang="en-US" dirty="0"/>
               <a:pPr/>
-              <a:t>5/10/2021</a:t>
+              <a:t>5/11/2021</a:t>
             </a:fld>
             <a:endParaRPr lang="en-US" dirty="0"/>
           </a:p>
@@ -2059,7 +2065,7 @@
             <a:fld id="{B61BEF0D-F0BB-DE4B-95CE-6DB70DBA9567}" type="datetimeFigureOut">
               <a:rPr lang="en-US" dirty="0"/>
               <a:pPr/>
-              <a:t>5/10/2021</a:t>
+              <a:t>5/11/2021</a:t>
             </a:fld>
             <a:endParaRPr lang="en-US" dirty="0"/>
           </a:p>
@@ -2526,7 +2532,7 @@
             <a:fld id="{B61BEF0D-F0BB-DE4B-95CE-6DB70DBA9567}" type="datetimeFigureOut">
               <a:rPr lang="en-US" dirty="0"/>
               <a:pPr/>
-              <a:t>5/10/2021</a:t>
+              <a:t>5/11/2021</a:t>
             </a:fld>
             <a:endParaRPr lang="en-US" dirty="0"/>
           </a:p>
@@ -2728,7 +2734,7 @@
             <a:fld id="{B61BEF0D-F0BB-DE4B-95CE-6DB70DBA9567}" type="datetimeFigureOut">
               <a:rPr lang="en-US" dirty="0"/>
               <a:pPr/>
-              <a:t>5/10/2021</a:t>
+              <a:t>5/11/2021</a:t>
             </a:fld>
             <a:endParaRPr lang="en-US" dirty="0"/>
           </a:p>
@@ -2936,7 +2942,7 @@
             <a:fld id="{B61BEF0D-F0BB-DE4B-95CE-6DB70DBA9567}" type="datetimeFigureOut">
               <a:rPr lang="en-US" dirty="0"/>
               <a:pPr/>
-              <a:t>5/10/2021</a:t>
+              <a:t>5/11/2021</a:t>
             </a:fld>
             <a:endParaRPr lang="en-US" dirty="0"/>
           </a:p>
@@ -3164,7 +3170,7 @@
           <a:p>
             <a:fld id="{52647F38-B617-4D2F-AE0A-013F0C4D2C57}" type="datetimeFigureOut">
               <a:rPr lang="en-US" dirty="0"/>
-              <a:t>5/10/2021</a:t>
+              <a:t>5/11/2021</a:t>
             </a:fld>
             <a:endParaRPr lang="en-US" dirty="0"/>
           </a:p>
@@ -3408,7 +3414,7 @@
             <a:fld id="{B61BEF0D-F0BB-DE4B-95CE-6DB70DBA9567}" type="datetimeFigureOut">
               <a:rPr lang="en-US" dirty="0"/>
               <a:pPr/>
-              <a:t>5/10/2021</a:t>
+              <a:t>5/11/2021</a:t>
             </a:fld>
             <a:endParaRPr lang="en-US" dirty="0"/>
           </a:p>
@@ -3702,7 +3708,7 @@
           <a:p>
             <a:fld id="{05BFA754-D5C3-4E66-96A6-867B257F58DC}" type="datetimeFigureOut">
               <a:rPr lang="en-US" dirty="0"/>
-              <a:t>5/10/2021</a:t>
+              <a:t>5/11/2021</a:t>
             </a:fld>
             <a:endParaRPr lang="en-US" dirty="0"/>
           </a:p>
@@ -4092,7 +4098,7 @@
             <a:fld id="{B61BEF0D-F0BB-DE4B-95CE-6DB70DBA9567}" type="datetimeFigureOut">
               <a:rPr lang="en-US" dirty="0"/>
               <a:pPr/>
-              <a:t>5/10/2021</a:t>
+              <a:t>5/11/2021</a:t>
             </a:fld>
             <a:endParaRPr lang="en-US" dirty="0"/>
           </a:p>
@@ -4238,7 +4244,7 @@
             <a:fld id="{B61BEF0D-F0BB-DE4B-95CE-6DB70DBA9567}" type="datetimeFigureOut">
               <a:rPr lang="en-US" dirty="0"/>
               <a:pPr/>
-              <a:t>5/10/2021</a:t>
+              <a:t>5/11/2021</a:t>
             </a:fld>
             <a:endParaRPr lang="en-US" dirty="0"/>
           </a:p>
@@ -4361,7 +4367,7 @@
             <a:fld id="{B61BEF0D-F0BB-DE4B-95CE-6DB70DBA9567}" type="datetimeFigureOut">
               <a:rPr lang="en-US" dirty="0"/>
               <a:pPr/>
-              <a:t>5/10/2021</a:t>
+              <a:t>5/11/2021</a:t>
             </a:fld>
             <a:endParaRPr lang="en-US" dirty="0"/>
           </a:p>
@@ -4613,7 +4619,7 @@
             <a:fld id="{B61BEF0D-F0BB-DE4B-95CE-6DB70DBA9567}" type="datetimeFigureOut">
               <a:rPr lang="en-US" dirty="0"/>
               <a:pPr/>
-              <a:t>5/10/2021</a:t>
+              <a:t>5/11/2021</a:t>
             </a:fld>
             <a:endParaRPr lang="en-US" dirty="0"/>
           </a:p>
@@ -4925,7 +4931,7 @@
             <a:fld id="{B61BEF0D-F0BB-DE4B-95CE-6DB70DBA9567}" type="datetimeFigureOut">
               <a:rPr lang="en-US" dirty="0"/>
               <a:pPr/>
-              <a:t>5/10/2021</a:t>
+              <a:t>5/11/2021</a:t>
             </a:fld>
             <a:endParaRPr lang="en-US" dirty="0"/>
           </a:p>
@@ -5273,7 +5279,7 @@
             <a:fld id="{B61BEF0D-F0BB-DE4B-95CE-6DB70DBA9567}" type="datetimeFigureOut">
               <a:rPr lang="en-US" dirty="0"/>
               <a:pPr/>
-              <a:t>5/10/2021</a:t>
+              <a:t>5/11/2021</a:t>
             </a:fld>
             <a:endParaRPr lang="en-US" dirty="0"/>
           </a:p>
@@ -6097,6 +6103,66 @@
           <a:chExt cx="0" cy="0"/>
         </a:xfrm>
       </p:grpSpPr>
+      <p:pic>
+        <p:nvPicPr>
+          <p:cNvPr id="5" name="Image 4"/>
+          <p:cNvPicPr>
+            <a:picLocks noChangeAspect="1"/>
+          </p:cNvPicPr>
+          <p:nvPr/>
+        </p:nvPicPr>
+        <p:blipFill>
+          <a:blip r:embed="rId2">
+            <a:extLst>
+              <a:ext uri="{28A0092B-C50C-407E-A947-70E740481C1C}">
+                <a14:useLocalDpi xmlns:a14="http://schemas.microsoft.com/office/drawing/2010/main" val="0"/>
+              </a:ext>
+            </a:extLst>
+          </a:blip>
+          <a:stretch>
+            <a:fillRect/>
+          </a:stretch>
+        </p:blipFill>
+        <p:spPr>
+          <a:xfrm>
+            <a:off x="2150076" y="654650"/>
+            <a:ext cx="7805445" cy="5511372"/>
+          </a:xfrm>
+          <a:prstGeom prst="rect">
+            <a:avLst/>
+          </a:prstGeom>
+        </p:spPr>
+      </p:pic>
+    </p:spTree>
+    <p:extLst>
+      <p:ext uri="{BB962C8B-B14F-4D97-AF65-F5344CB8AC3E}">
+        <p14:creationId xmlns:p14="http://schemas.microsoft.com/office/powerpoint/2010/main" val="3388127940"/>
+      </p:ext>
+    </p:extLst>
+  </p:cSld>
+  <p:clrMapOvr>
+    <a:masterClrMapping/>
+  </p:clrMapOvr>
+</p:sld>
+</file>
+
+<file path=ppt/slides/slide4.xml><?xml version="1.0" encoding="utf-8"?>
+<p:sld xmlns:a="http://schemas.openxmlformats.org/drawingml/2006/main" xmlns:r="http://schemas.openxmlformats.org/officeDocument/2006/relationships" xmlns:p="http://schemas.openxmlformats.org/presentationml/2006/main">
+  <p:cSld>
+    <p:spTree>
+      <p:nvGrpSpPr>
+        <p:cNvPr id="1" name=""/>
+        <p:cNvGrpSpPr/>
+        <p:nvPr/>
+      </p:nvGrpSpPr>
+      <p:grpSpPr>
+        <a:xfrm>
+          <a:off x="0" y="0"/>
+          <a:ext cx="0" cy="0"/>
+          <a:chOff x="0" y="0"/>
+          <a:chExt cx="0" cy="0"/>
+        </a:xfrm>
+      </p:grpSpPr>
       <p:sp>
         <p:nvSpPr>
           <p:cNvPr id="2" name="Titre 1"/>
@@ -6462,7 +6528,7 @@
 </p:sld>
 </file>
 
-<file path=ppt/slides/slide4.xml><?xml version="1.0" encoding="utf-8"?>
+<file path=ppt/slides/slide5.xml><?xml version="1.0" encoding="utf-8"?>
 <p:sld xmlns:a="http://schemas.openxmlformats.org/drawingml/2006/main" xmlns:r="http://schemas.openxmlformats.org/officeDocument/2006/relationships" xmlns:p="http://schemas.openxmlformats.org/presentationml/2006/main">
   <p:cSld>
     <p:spTree>

</xml_diff>